<commit_message>
added reproduction estimation heatmaps
</commit_message>
<xml_diff>
--- a/Analysis/HeatMaps/CombinedHeatmap.pptx
+++ b/Analysis/HeatMaps/CombinedHeatmap.pptx
@@ -104,6 +104,11 @@
       </a:defRPr>
     </a:lvl9pPr>
   </p:defaultTextStyle>
+  <p:extLst>
+    <p:ext uri="{EFAFB233-063F-42B5-8137-9DF3F51BA10A}">
+      <p15:sldGuideLst xmlns:p15="http://schemas.microsoft.com/office/powerpoint/2012/main"/>
+    </p:ext>
+  </p:extLst>
 </p:presentation>
 </file>
 
@@ -254,7 +259,7 @@
           <a:p>
             <a:fld id="{2394EBAF-99E3-874D-9511-851B08ADCAD5}" type="datetimeFigureOut">
               <a:rPr lang="en-US" smtClean="0"/>
-              <a:t>1/8/22</a:t>
+              <a:t>1/9/22</a:t>
             </a:fld>
             <a:endParaRPr lang="en-US"/>
           </a:p>
@@ -452,7 +457,7 @@
           <a:p>
             <a:fld id="{2394EBAF-99E3-874D-9511-851B08ADCAD5}" type="datetimeFigureOut">
               <a:rPr lang="en-US" smtClean="0"/>
-              <a:t>1/8/22</a:t>
+              <a:t>1/9/22</a:t>
             </a:fld>
             <a:endParaRPr lang="en-US"/>
           </a:p>
@@ -660,7 +665,7 @@
           <a:p>
             <a:fld id="{2394EBAF-99E3-874D-9511-851B08ADCAD5}" type="datetimeFigureOut">
               <a:rPr lang="en-US" smtClean="0"/>
-              <a:t>1/8/22</a:t>
+              <a:t>1/9/22</a:t>
             </a:fld>
             <a:endParaRPr lang="en-US"/>
           </a:p>
@@ -858,7 +863,7 @@
           <a:p>
             <a:fld id="{2394EBAF-99E3-874D-9511-851B08ADCAD5}" type="datetimeFigureOut">
               <a:rPr lang="en-US" smtClean="0"/>
-              <a:t>1/8/22</a:t>
+              <a:t>1/9/22</a:t>
             </a:fld>
             <a:endParaRPr lang="en-US"/>
           </a:p>
@@ -1133,7 +1138,7 @@
           <a:p>
             <a:fld id="{2394EBAF-99E3-874D-9511-851B08ADCAD5}" type="datetimeFigureOut">
               <a:rPr lang="en-US" smtClean="0"/>
-              <a:t>1/8/22</a:t>
+              <a:t>1/9/22</a:t>
             </a:fld>
             <a:endParaRPr lang="en-US"/>
           </a:p>
@@ -1398,7 +1403,7 @@
           <a:p>
             <a:fld id="{2394EBAF-99E3-874D-9511-851B08ADCAD5}" type="datetimeFigureOut">
               <a:rPr lang="en-US" smtClean="0"/>
-              <a:t>1/8/22</a:t>
+              <a:t>1/9/22</a:t>
             </a:fld>
             <a:endParaRPr lang="en-US"/>
           </a:p>
@@ -1810,7 +1815,7 @@
           <a:p>
             <a:fld id="{2394EBAF-99E3-874D-9511-851B08ADCAD5}" type="datetimeFigureOut">
               <a:rPr lang="en-US" smtClean="0"/>
-              <a:t>1/8/22</a:t>
+              <a:t>1/9/22</a:t>
             </a:fld>
             <a:endParaRPr lang="en-US"/>
           </a:p>
@@ -1951,7 +1956,7 @@
           <a:p>
             <a:fld id="{2394EBAF-99E3-874D-9511-851B08ADCAD5}" type="datetimeFigureOut">
               <a:rPr lang="en-US" smtClean="0"/>
-              <a:t>1/8/22</a:t>
+              <a:t>1/9/22</a:t>
             </a:fld>
             <a:endParaRPr lang="en-US"/>
           </a:p>
@@ -2064,7 +2069,7 @@
           <a:p>
             <a:fld id="{2394EBAF-99E3-874D-9511-851B08ADCAD5}" type="datetimeFigureOut">
               <a:rPr lang="en-US" smtClean="0"/>
-              <a:t>1/8/22</a:t>
+              <a:t>1/9/22</a:t>
             </a:fld>
             <a:endParaRPr lang="en-US"/>
           </a:p>
@@ -2375,7 +2380,7 @@
           <a:p>
             <a:fld id="{2394EBAF-99E3-874D-9511-851B08ADCAD5}" type="datetimeFigureOut">
               <a:rPr lang="en-US" smtClean="0"/>
-              <a:t>1/8/22</a:t>
+              <a:t>1/9/22</a:t>
             </a:fld>
             <a:endParaRPr lang="en-US"/>
           </a:p>
@@ -2663,7 +2668,7 @@
           <a:p>
             <a:fld id="{2394EBAF-99E3-874D-9511-851B08ADCAD5}" type="datetimeFigureOut">
               <a:rPr lang="en-US" smtClean="0"/>
-              <a:t>1/8/22</a:t>
+              <a:t>1/9/22</a:t>
             </a:fld>
             <a:endParaRPr lang="en-US"/>
           </a:p>
@@ -2904,7 +2909,7 @@
           <a:p>
             <a:fld id="{2394EBAF-99E3-874D-9511-851B08ADCAD5}" type="datetimeFigureOut">
               <a:rPr lang="en-US" smtClean="0"/>
-              <a:t>1/8/22</a:t>
+              <a:t>1/9/22</a:t>
             </a:fld>
             <a:endParaRPr lang="en-US"/>
           </a:p>
@@ -3321,37 +3326,12 @@
           <a:chExt cx="0" cy="0"/>
         </a:xfrm>
       </p:grpSpPr>
-      <p:sp>
-        <p:nvSpPr>
-          <p:cNvPr id="3" name="Subtitle 2">
-            <a:extLst>
-              <a:ext uri="{FF2B5EF4-FFF2-40B4-BE49-F238E27FC236}">
-                <a16:creationId xmlns:a16="http://schemas.microsoft.com/office/drawing/2014/main" id="{CEFBA5C7-2E5E-6F43-AA92-D5CCA24BCCFF}"/>
-              </a:ext>
-            </a:extLst>
-          </p:cNvPr>
-          <p:cNvSpPr>
-            <a:spLocks noGrp="1"/>
-          </p:cNvSpPr>
-          <p:nvPr>
-            <p:ph type="subTitle" idx="1"/>
-          </p:nvPr>
-        </p:nvSpPr>
-        <p:spPr/>
-        <p:txBody>
-          <a:bodyPr/>
-          <a:lstStyle/>
-          <a:p>
-            <a:endParaRPr lang="en-US"/>
-          </a:p>
-        </p:txBody>
-      </p:sp>
       <p:pic>
         <p:nvPicPr>
-          <p:cNvPr id="5" name="Picture 4">
-            <a:extLst>
-              <a:ext uri="{FF2B5EF4-FFF2-40B4-BE49-F238E27FC236}">
-                <a16:creationId xmlns:a16="http://schemas.microsoft.com/office/drawing/2014/main" id="{C2E1A84F-5EE9-C242-9465-A06402821A34}"/>
+          <p:cNvPr id="16" name="Picture 15">
+            <a:extLst>
+              <a:ext uri="{FF2B5EF4-FFF2-40B4-BE49-F238E27FC236}">
+                <a16:creationId xmlns:a16="http://schemas.microsoft.com/office/drawing/2014/main" id="{3B5E7E4E-EE2B-EA45-8E08-F34784ED3A88}"/>
               </a:ext>
             </a:extLst>
           </p:cNvPr>
@@ -3368,7 +3348,7 @@
         </p:blipFill>
         <p:spPr>
           <a:xfrm>
-            <a:off x="431800" y="1238250"/>
+            <a:off x="6260058" y="1373955"/>
             <a:ext cx="5842000" cy="4381500"/>
           </a:xfrm>
           <a:prstGeom prst="rect">
@@ -3378,10 +3358,10 @@
       </p:pic>
       <p:pic>
         <p:nvPicPr>
-          <p:cNvPr id="7" name="Picture 6">
-            <a:extLst>
-              <a:ext uri="{FF2B5EF4-FFF2-40B4-BE49-F238E27FC236}">
-                <a16:creationId xmlns:a16="http://schemas.microsoft.com/office/drawing/2014/main" id="{382B6CAE-632C-B544-A858-D1710E30DBA0}"/>
+          <p:cNvPr id="4" name="Picture 3">
+            <a:extLst>
+              <a:ext uri="{FF2B5EF4-FFF2-40B4-BE49-F238E27FC236}">
+                <a16:creationId xmlns:a16="http://schemas.microsoft.com/office/drawing/2014/main" id="{B412ECDD-A784-F041-94DA-12D6B29D0D7B}"/>
               </a:ext>
             </a:extLst>
           </p:cNvPr>
@@ -3398,7 +3378,7 @@
         </p:blipFill>
         <p:spPr>
           <a:xfrm>
-            <a:off x="6075392" y="1238250"/>
+            <a:off x="602725" y="1373955"/>
             <a:ext cx="5842000" cy="4381500"/>
           </a:xfrm>
           <a:prstGeom prst="rect">
@@ -3586,10 +3566,10 @@
       </p:sp>
       <p:sp>
         <p:nvSpPr>
-          <p:cNvPr id="15" name="Oval 14">
-            <a:extLst>
-              <a:ext uri="{FF2B5EF4-FFF2-40B4-BE49-F238E27FC236}">
-                <a16:creationId xmlns:a16="http://schemas.microsoft.com/office/drawing/2014/main" id="{0EFB7EAC-9D90-B647-B486-7896B7D955D5}"/>
+          <p:cNvPr id="6" name="Oval 5">
+            <a:extLst>
+              <a:ext uri="{FF2B5EF4-FFF2-40B4-BE49-F238E27FC236}">
+                <a16:creationId xmlns:a16="http://schemas.microsoft.com/office/drawing/2014/main" id="{308CBC95-1720-4748-99FB-B47D0EC2302D}"/>
               </a:ext>
             </a:extLst>
           </p:cNvPr>
@@ -3598,8 +3578,8 @@
         </p:nvSpPr>
         <p:spPr>
           <a:xfrm>
-            <a:off x="1885469" y="1705510"/>
-            <a:ext cx="2861192" cy="893852"/>
+            <a:off x="3053514" y="3244978"/>
+            <a:ext cx="296874" cy="412106"/>
           </a:xfrm>
           <a:prstGeom prst="ellipse">
             <a:avLst/>
@@ -3633,10 +3613,10 @@
       </p:sp>
       <p:sp>
         <p:nvSpPr>
-          <p:cNvPr id="17" name="Oval 16">
-            <a:extLst>
-              <a:ext uri="{FF2B5EF4-FFF2-40B4-BE49-F238E27FC236}">
-                <a16:creationId xmlns:a16="http://schemas.microsoft.com/office/drawing/2014/main" id="{5AE453AF-4B77-1F42-A2D2-07B0684ABE80}"/>
+          <p:cNvPr id="13" name="Oval 12">
+            <a:extLst>
+              <a:ext uri="{FF2B5EF4-FFF2-40B4-BE49-F238E27FC236}">
+                <a16:creationId xmlns:a16="http://schemas.microsoft.com/office/drawing/2014/main" id="{309A2A2D-54D4-4E4B-94F9-8515CECB44B5}"/>
               </a:ext>
             </a:extLst>
           </p:cNvPr>
@@ -3645,8 +3625,8 @@
         </p:nvSpPr>
         <p:spPr>
           <a:xfrm>
-            <a:off x="1160979" y="4212404"/>
-            <a:ext cx="363021" cy="893852"/>
+            <a:off x="3201951" y="1907007"/>
+            <a:ext cx="1753175" cy="496562"/>
           </a:xfrm>
           <a:prstGeom prst="ellipse">
             <a:avLst/>

</xml_diff>

<commit_message>
more plots and larger population data folder
</commit_message>
<xml_diff>
--- a/Analysis/HeatMaps/CombinedHeatmap.pptx
+++ b/Analysis/HeatMaps/CombinedHeatmap.pptx
@@ -3578,7 +3578,7 @@
         </p:nvSpPr>
         <p:spPr>
           <a:xfrm>
-            <a:off x="3053514" y="3244978"/>
+            <a:off x="3053514" y="3383710"/>
             <a:ext cx="296874" cy="412106"/>
           </a:xfrm>
           <a:prstGeom prst="ellipse">
@@ -3625,8 +3625,8 @@
         </p:nvSpPr>
         <p:spPr>
           <a:xfrm>
-            <a:off x="3201951" y="1907007"/>
-            <a:ext cx="1753175" cy="496562"/>
+            <a:off x="3537823" y="1907007"/>
+            <a:ext cx="422475" cy="496562"/>
           </a:xfrm>
           <a:prstGeom prst="ellipse">
             <a:avLst/>

</xml_diff>